<commit_message>
adding dates to search parameters and file names
</commit_message>
<xml_diff>
--- a/lr.pptx
+++ b/lr.pptx
@@ -270,7 +270,7 @@
           <a:p>
             <a:fld id="{340CF987-11E5-4EE6-ADEF-C1DD90B18B79}" type="datetimeFigureOut">
               <a:rPr lang="en-GB" smtClean="0"/>
-              <a:t>14/01/2022</a:t>
+              <a:t>18/01/2022</a:t>
             </a:fld>
             <a:endParaRPr lang="en-GB"/>
           </a:p>
@@ -470,7 +470,7 @@
           <a:p>
             <a:fld id="{340CF987-11E5-4EE6-ADEF-C1DD90B18B79}" type="datetimeFigureOut">
               <a:rPr lang="en-GB" smtClean="0"/>
-              <a:t>14/01/2022</a:t>
+              <a:t>18/01/2022</a:t>
             </a:fld>
             <a:endParaRPr lang="en-GB"/>
           </a:p>
@@ -680,7 +680,7 @@
           <a:p>
             <a:fld id="{340CF987-11E5-4EE6-ADEF-C1DD90B18B79}" type="datetimeFigureOut">
               <a:rPr lang="en-GB" smtClean="0"/>
-              <a:t>14/01/2022</a:t>
+              <a:t>18/01/2022</a:t>
             </a:fld>
             <a:endParaRPr lang="en-GB"/>
           </a:p>
@@ -880,7 +880,7 @@
           <a:p>
             <a:fld id="{340CF987-11E5-4EE6-ADEF-C1DD90B18B79}" type="datetimeFigureOut">
               <a:rPr lang="en-GB" smtClean="0"/>
-              <a:t>14/01/2022</a:t>
+              <a:t>18/01/2022</a:t>
             </a:fld>
             <a:endParaRPr lang="en-GB"/>
           </a:p>
@@ -1156,7 +1156,7 @@
           <a:p>
             <a:fld id="{340CF987-11E5-4EE6-ADEF-C1DD90B18B79}" type="datetimeFigureOut">
               <a:rPr lang="en-GB" smtClean="0"/>
-              <a:t>14/01/2022</a:t>
+              <a:t>18/01/2022</a:t>
             </a:fld>
             <a:endParaRPr lang="en-GB"/>
           </a:p>
@@ -1424,7 +1424,7 @@
           <a:p>
             <a:fld id="{340CF987-11E5-4EE6-ADEF-C1DD90B18B79}" type="datetimeFigureOut">
               <a:rPr lang="en-GB" smtClean="0"/>
-              <a:t>14/01/2022</a:t>
+              <a:t>18/01/2022</a:t>
             </a:fld>
             <a:endParaRPr lang="en-GB"/>
           </a:p>
@@ -1839,7 +1839,7 @@
           <a:p>
             <a:fld id="{340CF987-11E5-4EE6-ADEF-C1DD90B18B79}" type="datetimeFigureOut">
               <a:rPr lang="en-GB" smtClean="0"/>
-              <a:t>14/01/2022</a:t>
+              <a:t>18/01/2022</a:t>
             </a:fld>
             <a:endParaRPr lang="en-GB"/>
           </a:p>
@@ -1981,7 +1981,7 @@
           <a:p>
             <a:fld id="{340CF987-11E5-4EE6-ADEF-C1DD90B18B79}" type="datetimeFigureOut">
               <a:rPr lang="en-GB" smtClean="0"/>
-              <a:t>14/01/2022</a:t>
+              <a:t>18/01/2022</a:t>
             </a:fld>
             <a:endParaRPr lang="en-GB"/>
           </a:p>
@@ -2094,7 +2094,7 @@
           <a:p>
             <a:fld id="{340CF987-11E5-4EE6-ADEF-C1DD90B18B79}" type="datetimeFigureOut">
               <a:rPr lang="en-GB" smtClean="0"/>
-              <a:t>14/01/2022</a:t>
+              <a:t>18/01/2022</a:t>
             </a:fld>
             <a:endParaRPr lang="en-GB"/>
           </a:p>
@@ -2407,7 +2407,7 @@
           <a:p>
             <a:fld id="{340CF987-11E5-4EE6-ADEF-C1DD90B18B79}" type="datetimeFigureOut">
               <a:rPr lang="en-GB" smtClean="0"/>
-              <a:t>14/01/2022</a:t>
+              <a:t>18/01/2022</a:t>
             </a:fld>
             <a:endParaRPr lang="en-GB"/>
           </a:p>
@@ -2696,7 +2696,7 @@
           <a:p>
             <a:fld id="{340CF987-11E5-4EE6-ADEF-C1DD90B18B79}" type="datetimeFigureOut">
               <a:rPr lang="en-GB" smtClean="0"/>
-              <a:t>14/01/2022</a:t>
+              <a:t>18/01/2022</a:t>
             </a:fld>
             <a:endParaRPr lang="en-GB"/>
           </a:p>
@@ -2939,7 +2939,7 @@
           <a:p>
             <a:fld id="{340CF987-11E5-4EE6-ADEF-C1DD90B18B79}" type="datetimeFigureOut">
               <a:rPr lang="en-GB" smtClean="0"/>
-              <a:t>14/01/2022</a:t>
+              <a:t>18/01/2022</a:t>
             </a:fld>
             <a:endParaRPr lang="en-GB"/>
           </a:p>
@@ -3561,7 +3561,7 @@
         <p:spPr>
           <a:xfrm>
             <a:off x="2079416" y="179274"/>
-            <a:ext cx="7885385" cy="6678726"/>
+            <a:ext cx="7885385" cy="6678725"/>
           </a:xfrm>
           <a:prstGeom prst="rect">
             <a:avLst/>
@@ -4957,7 +4957,7 @@
         <p:spPr>
           <a:xfrm>
             <a:off x="5174701" y="912370"/>
-            <a:ext cx="6550812" cy="5247570"/>
+            <a:ext cx="6550812" cy="5247569"/>
           </a:xfrm>
           <a:prstGeom prst="rect">
             <a:avLst/>
@@ -4983,7 +4983,7 @@
         <p:spPr>
           <a:xfrm>
             <a:off x="792018" y="966642"/>
-            <a:ext cx="4084782" cy="4926157"/>
+            <a:ext cx="4084782" cy="5692776"/>
           </a:xfrm>
         </p:spPr>
         <p:txBody>
@@ -5023,6 +5023,33 @@
             <a:r>
               <a:rPr lang="en-US" dirty="0"/>
               <a:t>9 additional papers</a:t>
+            </a:r>
+          </a:p>
+          <a:p>
+            <a:r>
+              <a:rPr lang="en-US" dirty="0"/>
+              <a:t>Manual removal of repeated:</a:t>
+            </a:r>
+          </a:p>
+          <a:p>
+            <a:pPr lvl="1"/>
+            <a:r>
+              <a:rPr lang="en-US" dirty="0"/>
+              <a:t>A total of 136 papers</a:t>
+            </a:r>
+          </a:p>
+          <a:p>
+            <a:pPr lvl="1"/>
+            <a:r>
+              <a:rPr lang="en-US" dirty="0"/>
+              <a:t>61 architectures</a:t>
+            </a:r>
+          </a:p>
+          <a:p>
+            <a:pPr lvl="1"/>
+            <a:r>
+              <a:rPr lang="en-US" dirty="0"/>
+              <a:t>75 experiments</a:t>
             </a:r>
           </a:p>
         </p:txBody>

</xml_diff>